<commit_message>
Update laura about me
</commit_message>
<xml_diff>
--- a/SQLKonferenz2023/laura_about_me.pptx
+++ b/SQLKonferenz2023/laura_about_me.pptx
@@ -208,7 +208,7 @@
           <a:p>
             <a:fld id="{7BA1BAB3-C3D8-4237-9E54-6E78F35B7E82}" type="datetimeFigureOut">
               <a:rPr lang="de-DE" smtClean="0"/>
-              <a:t>16.07.2023</a:t>
+              <a:t>17.07.2023</a:t>
             </a:fld>
             <a:endParaRPr lang="de-DE"/>
           </a:p>
@@ -2377,6 +2377,60 @@
       </p:grpSpPr>
       <p:pic>
         <p:nvPicPr>
+          <p:cNvPr id="6" name="Grafik 5">
+            <a:extLst>
+              <a:ext uri="{FF2B5EF4-FFF2-40B4-BE49-F238E27FC236}">
+                <a16:creationId xmlns:a16="http://schemas.microsoft.com/office/drawing/2014/main" id="{6712C9D2-BDA0-7A3D-977F-8C43437A9120}"/>
+              </a:ext>
+            </a:extLst>
+          </p:cNvPr>
+          <p:cNvPicPr>
+            <a:picLocks noChangeAspect="1"/>
+          </p:cNvPicPr>
+          <p:nvPr/>
+        </p:nvPicPr>
+        <p:blipFill>
+          <a:blip r:embed="rId2"/>
+          <a:stretch>
+            <a:fillRect/>
+          </a:stretch>
+        </p:blipFill>
+        <p:spPr>
+          <a:xfrm>
+            <a:off x="883381" y="1287639"/>
+            <a:ext cx="4430567" cy="4221646"/>
+          </a:xfrm>
+          <a:prstGeom prst="rect">
+            <a:avLst/>
+          </a:prstGeom>
+          <a:ln w="127000" cap="rnd">
+            <a:solidFill>
+              <a:srgbClr val="FFFFFF"/>
+            </a:solidFill>
+          </a:ln>
+          <a:effectLst>
+            <a:outerShdw blurRad="76200" dist="95250" dir="10500000" sx="97000" sy="23000" kx="900000" algn="br" rotWithShape="0">
+              <a:srgbClr val="000000">
+                <a:alpha val="20000"/>
+              </a:srgbClr>
+            </a:outerShdw>
+          </a:effectLst>
+          <a:scene3d>
+            <a:camera prst="orthographicFront"/>
+            <a:lightRig rig="twoPt" dir="t">
+              <a:rot lat="0" lon="0" rev="7800000"/>
+            </a:lightRig>
+          </a:scene3d>
+          <a:sp3d contourW="6350">
+            <a:bevelT w="50800" h="16510"/>
+            <a:contourClr>
+              <a:srgbClr val="C0C0C0"/>
+            </a:contourClr>
+          </a:sp3d>
+        </p:spPr>
+      </p:pic>
+      <p:pic>
+        <p:nvPicPr>
           <p:cNvPr id="3" name="Grafik 2" descr="Ein Bild, das Text, Symbol, Logo, Emblem enthält.&#10;&#10;Automatisch generierte Beschreibung">
             <a:extLst>
               <a:ext uri="{FF2B5EF4-FFF2-40B4-BE49-F238E27FC236}">
@@ -2390,7 +2444,7 @@
           <p:nvPr/>
         </p:nvPicPr>
         <p:blipFill>
-          <a:blip r:embed="rId2"/>
+          <a:blip r:embed="rId3"/>
           <a:stretch>
             <a:fillRect/>
           </a:stretch>
@@ -2427,36 +2481,6 @@
           </a:p>
         </p:txBody>
       </p:sp>
-      <p:pic>
-        <p:nvPicPr>
-          <p:cNvPr id="4" name="Picture 3">
-            <a:extLst>
-              <a:ext uri="{FF2B5EF4-FFF2-40B4-BE49-F238E27FC236}">
-                <a16:creationId xmlns:a16="http://schemas.microsoft.com/office/drawing/2014/main" id="{1DD672A4-36FC-492F-BB58-C0F1C49CE6FC}"/>
-              </a:ext>
-            </a:extLst>
-          </p:cNvPr>
-          <p:cNvPicPr>
-            <a:picLocks noChangeAspect="1"/>
-          </p:cNvPicPr>
-          <p:nvPr/>
-        </p:nvPicPr>
-        <p:blipFill>
-          <a:blip r:embed="rId3"/>
-          <a:stretch>
-            <a:fillRect/>
-          </a:stretch>
-        </p:blipFill>
-        <p:spPr>
-          <a:xfrm>
-            <a:off x="883381" y="1287638"/>
-            <a:ext cx="3974698" cy="4221646"/>
-          </a:xfrm>
-          <a:prstGeom prst="rect">
-            <a:avLst/>
-          </a:prstGeom>
-        </p:spPr>
-      </p:pic>
       <p:sp>
         <p:nvSpPr>
           <p:cNvPr id="5" name="TextBox 4">
@@ -2487,7 +2511,7 @@
           <a:p>
             <a:r>
               <a:rPr lang="de-DE" sz="1400" dirty="0"/>
-              <a:t>https://www.linkedin.com/in/alexander-karl-44561012a/</a:t>
+              <a:t>https://www.linkedin.com/in/laura-richardt-550ba4154/</a:t>
             </a:r>
           </a:p>
         </p:txBody>

</xml_diff>